<commit_message>
Update: new code structure that makes tweaking the HHLM easier
Now we can easily change the crystal surfaces, asymmetry angles, distance between crystals etc. in the code. I will start looping different cases tomorrow but I can't promise since Yanwen's experiment just started (X474)
</commit_message>
<xml_diff>
--- a/LCLS/HHLM_performance.pptx
+++ b/LCLS/HHLM_performance.pptx
@@ -105,6 +105,11 @@
       </a:defRPr>
     </a:lvl9pPr>
   </p:defaultTextStyle>
+  <p:extLst>
+    <p:ext uri="{EFAFB233-063F-42B5-8137-9DF3F51BA10A}">
+      <p15:sldGuideLst xmlns:p15="http://schemas.microsoft.com/office/powerpoint/2012/main"/>
+    </p:ext>
+  </p:extLst>
 </p:presentation>
 </file>
 
@@ -255,7 +260,7 @@
           <a:p>
             <a:fld id="{46759443-2359-4515-9AEB-2809FF2BFC4E}" type="datetimeFigureOut">
               <a:rPr lang="zh-CN" altLang="en-US" smtClean="0"/>
-              <a:t>2021/6/30</a:t>
+              <a:t>2021/7/1</a:t>
             </a:fld>
             <a:endParaRPr lang="zh-CN" altLang="en-US"/>
           </a:p>
@@ -453,7 +458,7 @@
           <a:p>
             <a:fld id="{46759443-2359-4515-9AEB-2809FF2BFC4E}" type="datetimeFigureOut">
               <a:rPr lang="zh-CN" altLang="en-US" smtClean="0"/>
-              <a:t>2021/6/30</a:t>
+              <a:t>2021/7/1</a:t>
             </a:fld>
             <a:endParaRPr lang="zh-CN" altLang="en-US"/>
           </a:p>
@@ -661,7 +666,7 @@
           <a:p>
             <a:fld id="{46759443-2359-4515-9AEB-2809FF2BFC4E}" type="datetimeFigureOut">
               <a:rPr lang="zh-CN" altLang="en-US" smtClean="0"/>
-              <a:t>2021/6/30</a:t>
+              <a:t>2021/7/1</a:t>
             </a:fld>
             <a:endParaRPr lang="zh-CN" altLang="en-US"/>
           </a:p>
@@ -859,7 +864,7 @@
           <a:p>
             <a:fld id="{46759443-2359-4515-9AEB-2809FF2BFC4E}" type="datetimeFigureOut">
               <a:rPr lang="zh-CN" altLang="en-US" smtClean="0"/>
-              <a:t>2021/6/30</a:t>
+              <a:t>2021/7/1</a:t>
             </a:fld>
             <a:endParaRPr lang="zh-CN" altLang="en-US"/>
           </a:p>
@@ -1134,7 +1139,7 @@
           <a:p>
             <a:fld id="{46759443-2359-4515-9AEB-2809FF2BFC4E}" type="datetimeFigureOut">
               <a:rPr lang="zh-CN" altLang="en-US" smtClean="0"/>
-              <a:t>2021/6/30</a:t>
+              <a:t>2021/7/1</a:t>
             </a:fld>
             <a:endParaRPr lang="zh-CN" altLang="en-US"/>
           </a:p>
@@ -1399,7 +1404,7 @@
           <a:p>
             <a:fld id="{46759443-2359-4515-9AEB-2809FF2BFC4E}" type="datetimeFigureOut">
               <a:rPr lang="zh-CN" altLang="en-US" smtClean="0"/>
-              <a:t>2021/6/30</a:t>
+              <a:t>2021/7/1</a:t>
             </a:fld>
             <a:endParaRPr lang="zh-CN" altLang="en-US"/>
           </a:p>
@@ -1811,7 +1816,7 @@
           <a:p>
             <a:fld id="{46759443-2359-4515-9AEB-2809FF2BFC4E}" type="datetimeFigureOut">
               <a:rPr lang="zh-CN" altLang="en-US" smtClean="0"/>
-              <a:t>2021/6/30</a:t>
+              <a:t>2021/7/1</a:t>
             </a:fld>
             <a:endParaRPr lang="zh-CN" altLang="en-US"/>
           </a:p>
@@ -1952,7 +1957,7 @@
           <a:p>
             <a:fld id="{46759443-2359-4515-9AEB-2809FF2BFC4E}" type="datetimeFigureOut">
               <a:rPr lang="zh-CN" altLang="en-US" smtClean="0"/>
-              <a:t>2021/6/30</a:t>
+              <a:t>2021/7/1</a:t>
             </a:fld>
             <a:endParaRPr lang="zh-CN" altLang="en-US"/>
           </a:p>
@@ -2065,7 +2070,7 @@
           <a:p>
             <a:fld id="{46759443-2359-4515-9AEB-2809FF2BFC4E}" type="datetimeFigureOut">
               <a:rPr lang="zh-CN" altLang="en-US" smtClean="0"/>
-              <a:t>2021/6/30</a:t>
+              <a:t>2021/7/1</a:t>
             </a:fld>
             <a:endParaRPr lang="zh-CN" altLang="en-US"/>
           </a:p>
@@ -2376,7 +2381,7 @@
           <a:p>
             <a:fld id="{46759443-2359-4515-9AEB-2809FF2BFC4E}" type="datetimeFigureOut">
               <a:rPr lang="zh-CN" altLang="en-US" smtClean="0"/>
-              <a:t>2021/6/30</a:t>
+              <a:t>2021/7/1</a:t>
             </a:fld>
             <a:endParaRPr lang="zh-CN" altLang="en-US"/>
           </a:p>
@@ -2664,7 +2669,7 @@
           <a:p>
             <a:fld id="{46759443-2359-4515-9AEB-2809FF2BFC4E}" type="datetimeFigureOut">
               <a:rPr lang="zh-CN" altLang="en-US" smtClean="0"/>
-              <a:t>2021/6/30</a:t>
+              <a:t>2021/7/1</a:t>
             </a:fld>
             <a:endParaRPr lang="zh-CN" altLang="en-US"/>
           </a:p>
@@ -2905,7 +2910,7 @@
           <a:p>
             <a:fld id="{46759443-2359-4515-9AEB-2809FF2BFC4E}" type="datetimeFigureOut">
               <a:rPr lang="zh-CN" altLang="en-US" smtClean="0"/>
-              <a:t>2021/6/30</a:t>
+              <a:t>2021/7/1</a:t>
             </a:fld>
             <a:endParaRPr lang="zh-CN" altLang="en-US"/>
           </a:p>

</xml_diff>